<commit_message>
made sure annotated figs matched most recent GAM models.
</commit_message>
<xml_diff>
--- a/annotated_figs/annotated_figs.pptx
+++ b/annotated_figs/annotated_figs.pptx
@@ -858,7 +858,7 @@
           <a:p>
             <a:fld id="{42C84687-54B3-9748-A1FD-3A8F61AE5F7D}" type="datetimeFigureOut">
               <a:rPr lang="en-US" smtClean="0"/>
-              <a:t>12/6/25</a:t>
+              <a:t>12/10/25</a:t>
             </a:fld>
             <a:endParaRPr lang="en-US"/>
           </a:p>
@@ -2467,7 +2467,7 @@
           <a:p>
             <a:fld id="{3E66DE56-A318-0A48-A3AA-E3B2FAE5D501}" type="datetimeFigureOut">
               <a:rPr lang="en-US" smtClean="0"/>
-              <a:t>12/6/25</a:t>
+              <a:t>12/10/25</a:t>
             </a:fld>
             <a:endParaRPr lang="en-US"/>
           </a:p>
@@ -2665,7 +2665,7 @@
           <a:p>
             <a:fld id="{3E66DE56-A318-0A48-A3AA-E3B2FAE5D501}" type="datetimeFigureOut">
               <a:rPr lang="en-US" smtClean="0"/>
-              <a:t>12/6/25</a:t>
+              <a:t>12/10/25</a:t>
             </a:fld>
             <a:endParaRPr lang="en-US"/>
           </a:p>
@@ -2873,7 +2873,7 @@
           <a:p>
             <a:fld id="{3E66DE56-A318-0A48-A3AA-E3B2FAE5D501}" type="datetimeFigureOut">
               <a:rPr lang="en-US" smtClean="0"/>
-              <a:t>12/6/25</a:t>
+              <a:t>12/10/25</a:t>
             </a:fld>
             <a:endParaRPr lang="en-US"/>
           </a:p>
@@ -3071,7 +3071,7 @@
           <a:p>
             <a:fld id="{3E66DE56-A318-0A48-A3AA-E3B2FAE5D501}" type="datetimeFigureOut">
               <a:rPr lang="en-US" smtClean="0"/>
-              <a:t>12/6/25</a:t>
+              <a:t>12/10/25</a:t>
             </a:fld>
             <a:endParaRPr lang="en-US"/>
           </a:p>
@@ -3346,7 +3346,7 @@
           <a:p>
             <a:fld id="{3E66DE56-A318-0A48-A3AA-E3B2FAE5D501}" type="datetimeFigureOut">
               <a:rPr lang="en-US" smtClean="0"/>
-              <a:t>12/6/25</a:t>
+              <a:t>12/10/25</a:t>
             </a:fld>
             <a:endParaRPr lang="en-US"/>
           </a:p>
@@ -3611,7 +3611,7 @@
           <a:p>
             <a:fld id="{3E66DE56-A318-0A48-A3AA-E3B2FAE5D501}" type="datetimeFigureOut">
               <a:rPr lang="en-US" smtClean="0"/>
-              <a:t>12/6/25</a:t>
+              <a:t>12/10/25</a:t>
             </a:fld>
             <a:endParaRPr lang="en-US"/>
           </a:p>
@@ -4023,7 +4023,7 @@
           <a:p>
             <a:fld id="{3E66DE56-A318-0A48-A3AA-E3B2FAE5D501}" type="datetimeFigureOut">
               <a:rPr lang="en-US" smtClean="0"/>
-              <a:t>12/6/25</a:t>
+              <a:t>12/10/25</a:t>
             </a:fld>
             <a:endParaRPr lang="en-US"/>
           </a:p>
@@ -4164,7 +4164,7 @@
           <a:p>
             <a:fld id="{3E66DE56-A318-0A48-A3AA-E3B2FAE5D501}" type="datetimeFigureOut">
               <a:rPr lang="en-US" smtClean="0"/>
-              <a:t>12/6/25</a:t>
+              <a:t>12/10/25</a:t>
             </a:fld>
             <a:endParaRPr lang="en-US"/>
           </a:p>
@@ -4277,7 +4277,7 @@
           <a:p>
             <a:fld id="{3E66DE56-A318-0A48-A3AA-E3B2FAE5D501}" type="datetimeFigureOut">
               <a:rPr lang="en-US" smtClean="0"/>
-              <a:t>12/6/25</a:t>
+              <a:t>12/10/25</a:t>
             </a:fld>
             <a:endParaRPr lang="en-US"/>
           </a:p>
@@ -4588,7 +4588,7 @@
           <a:p>
             <a:fld id="{3E66DE56-A318-0A48-A3AA-E3B2FAE5D501}" type="datetimeFigureOut">
               <a:rPr lang="en-US" smtClean="0"/>
-              <a:t>12/6/25</a:t>
+              <a:t>12/10/25</a:t>
             </a:fld>
             <a:endParaRPr lang="en-US"/>
           </a:p>
@@ -4876,7 +4876,7 @@
           <a:p>
             <a:fld id="{3E66DE56-A318-0A48-A3AA-E3B2FAE5D501}" type="datetimeFigureOut">
               <a:rPr lang="en-US" smtClean="0"/>
-              <a:t>12/6/25</a:t>
+              <a:t>12/10/25</a:t>
             </a:fld>
             <a:endParaRPr lang="en-US"/>
           </a:p>
@@ -5117,7 +5117,7 @@
           <a:p>
             <a:fld id="{3E66DE56-A318-0A48-A3AA-E3B2FAE5D501}" type="datetimeFigureOut">
               <a:rPr lang="en-US" smtClean="0"/>
-              <a:t>12/6/25</a:t>
+              <a:t>12/10/25</a:t>
             </a:fld>
             <a:endParaRPr lang="en-US"/>
           </a:p>
@@ -14355,6 +14355,26 @@
 </file>
 
 <file path=customXml/item1.xml><?xml version="1.0" encoding="utf-8"?>
+<p:properties xmlns:p="http://schemas.microsoft.com/office/2006/metadata/properties" xmlns:xsi="http://www.w3.org/2001/XMLSchema-instance" xmlns:pc="http://schemas.microsoft.com/office/infopath/2007/PartnerControls">
+  <documentManagement>
+    <TaxCatchAll xmlns="12e3a79e-b758-4660-884f-5860278e0032" xsi:nil="true"/>
+    <lcf76f155ced4ddcb4097134ff3c332f xmlns="f86ba2e4-d0c6-4664-9310-24acd3d22541">
+      <Terms xmlns="http://schemas.microsoft.com/office/infopath/2007/PartnerControls"/>
+    </lcf76f155ced4ddcb4097134ff3c332f>
+  </documentManagement>
+</p:properties>
+</file>
+
+<file path=customXml/item2.xml><?xml version="1.0" encoding="utf-8"?>
+<?mso-contentType ?>
+<FormTemplates xmlns="http://schemas.microsoft.com/sharepoint/v3/contenttype/forms">
+  <Display>DocumentLibraryForm</Display>
+  <Edit>DocumentLibraryForm</Edit>
+  <New>DocumentLibraryForm</New>
+</FormTemplates>
+</file>
+
+<file path=customXml/item3.xml><?xml version="1.0" encoding="utf-8"?>
 <ct:contentTypeSchema xmlns:ct="http://schemas.microsoft.com/office/2006/metadata/contentType" xmlns:ma="http://schemas.microsoft.com/office/2006/metadata/properties/metaAttributes" ct:_="" ma:_="" ma:contentTypeName="Document" ma:contentTypeID="0x0101009522846501CC4E42BA690349A1E2BAE7" ma:contentTypeVersion="18" ma:contentTypeDescription="Create a new document." ma:contentTypeScope="" ma:versionID="ee15b082ae5f42658b15512c954eabe8">
   <xsd:schema xmlns:xsd="http://www.w3.org/2001/XMLSchema" xmlns:xs="http://www.w3.org/2001/XMLSchema" xmlns:p="http://schemas.microsoft.com/office/2006/metadata/properties" xmlns:ns2="f86ba2e4-d0c6-4664-9310-24acd3d22541" xmlns:ns3="12e3a79e-b758-4660-884f-5860278e0032" targetNamespace="http://schemas.microsoft.com/office/2006/metadata/properties" ma:root="true" ma:fieldsID="49226fc8a5dcb556077b58f373c68dac" ns2:_="" ns3:_="">
     <xsd:import namespace="f86ba2e4-d0c6-4664-9310-24acd3d22541"/>
@@ -14609,27 +14629,32 @@
 </ct:contentTypeSchema>
 </file>
 
-<file path=customXml/item2.xml><?xml version="1.0" encoding="utf-8"?>
-<?mso-contentType ?>
-<FormTemplates xmlns="http://schemas.microsoft.com/sharepoint/v3/contenttype/forms">
-  <Display>DocumentLibraryForm</Display>
-  <Edit>DocumentLibraryForm</Edit>
-  <New>DocumentLibraryForm</New>
-</FormTemplates>
+<file path=customXml/itemProps1.xml><?xml version="1.0" encoding="utf-8"?>
+<ds:datastoreItem xmlns:ds="http://schemas.openxmlformats.org/officeDocument/2006/customXml" ds:itemID="{6262FB06-D632-4091-BA8B-911DD016195D}">
+  <ds:schemaRefs>
+    <ds:schemaRef ds:uri="http://schemas.microsoft.com/office/2006/metadata/properties"/>
+    <ds:schemaRef ds:uri="http://schemas.microsoft.com/office/2006/documentManagement/types"/>
+    <ds:schemaRef ds:uri="http://www.w3.org/XML/1998/namespace"/>
+    <ds:schemaRef ds:uri="http://purl.org/dc/terms/"/>
+    <ds:schemaRef ds:uri="http://schemas.openxmlformats.org/package/2006/metadata/core-properties"/>
+    <ds:schemaRef ds:uri="12e3a79e-b758-4660-884f-5860278e0032"/>
+    <ds:schemaRef ds:uri="http://purl.org/dc/elements/1.1/"/>
+    <ds:schemaRef ds:uri="http://schemas.microsoft.com/office/infopath/2007/PartnerControls"/>
+    <ds:schemaRef ds:uri="f86ba2e4-d0c6-4664-9310-24acd3d22541"/>
+    <ds:schemaRef ds:uri="http://purl.org/dc/dcmitype/"/>
+  </ds:schemaRefs>
+</ds:datastoreItem>
 </file>
 
-<file path=customXml/item3.xml><?xml version="1.0" encoding="utf-8"?>
-<p:properties xmlns:p="http://schemas.microsoft.com/office/2006/metadata/properties" xmlns:xsi="http://www.w3.org/2001/XMLSchema-instance" xmlns:pc="http://schemas.microsoft.com/office/infopath/2007/PartnerControls">
-  <documentManagement>
-    <TaxCatchAll xmlns="12e3a79e-b758-4660-884f-5860278e0032" xsi:nil="true"/>
-    <lcf76f155ced4ddcb4097134ff3c332f xmlns="f86ba2e4-d0c6-4664-9310-24acd3d22541">
-      <Terms xmlns="http://schemas.microsoft.com/office/infopath/2007/PartnerControls"/>
-    </lcf76f155ced4ddcb4097134ff3c332f>
-  </documentManagement>
-</p:properties>
+<file path=customXml/itemProps2.xml><?xml version="1.0" encoding="utf-8"?>
+<ds:datastoreItem xmlns:ds="http://schemas.openxmlformats.org/officeDocument/2006/customXml" ds:itemID="{31C316A3-6F90-4234-8830-689BDD04FFFE}">
+  <ds:schemaRefs>
+    <ds:schemaRef ds:uri="http://schemas.microsoft.com/sharepoint/v3/contenttype/forms"/>
+  </ds:schemaRefs>
+</ds:datastoreItem>
 </file>
 
-<file path=customXml/itemProps1.xml><?xml version="1.0" encoding="utf-8"?>
+<file path=customXml/itemProps3.xml><?xml version="1.0" encoding="utf-8"?>
 <ds:datastoreItem xmlns:ds="http://schemas.openxmlformats.org/officeDocument/2006/customXml" ds:itemID="{795F9458-AD7D-4701-A8D2-E9AA7E505B8A}">
   <ds:schemaRefs>
     <ds:schemaRef ds:uri="http://schemas.microsoft.com/office/2006/metadata/contentType"/>
@@ -14646,29 +14671,4 @@
     <ds:schemaRef ds:uri="http://schemas.microsoft.com/internal/obd"/>
   </ds:schemaRefs>
 </ds:datastoreItem>
-</file>
-
-<file path=customXml/itemProps2.xml><?xml version="1.0" encoding="utf-8"?>
-<ds:datastoreItem xmlns:ds="http://schemas.openxmlformats.org/officeDocument/2006/customXml" ds:itemID="{31C316A3-6F90-4234-8830-689BDD04FFFE}">
-  <ds:schemaRefs>
-    <ds:schemaRef ds:uri="http://schemas.microsoft.com/sharepoint/v3/contenttype/forms"/>
-  </ds:schemaRefs>
-</ds:datastoreItem>
-</file>
-
-<file path=customXml/itemProps3.xml><?xml version="1.0" encoding="utf-8"?>
-<ds:datastoreItem xmlns:ds="http://schemas.openxmlformats.org/officeDocument/2006/customXml" ds:itemID="{6262FB06-D632-4091-BA8B-911DD016195D}">
-  <ds:schemaRefs>
-    <ds:schemaRef ds:uri="http://schemas.microsoft.com/office/2006/metadata/properties"/>
-    <ds:schemaRef ds:uri="http://schemas.microsoft.com/office/2006/documentManagement/types"/>
-    <ds:schemaRef ds:uri="http://www.w3.org/XML/1998/namespace"/>
-    <ds:schemaRef ds:uri="http://purl.org/dc/terms/"/>
-    <ds:schemaRef ds:uri="http://schemas.openxmlformats.org/package/2006/metadata/core-properties"/>
-    <ds:schemaRef ds:uri="12e3a79e-b758-4660-884f-5860278e0032"/>
-    <ds:schemaRef ds:uri="http://purl.org/dc/elements/1.1/"/>
-    <ds:schemaRef ds:uri="http://schemas.microsoft.com/office/infopath/2007/PartnerControls"/>
-    <ds:schemaRef ds:uri="f86ba2e4-d0c6-4664-9310-24acd3d22541"/>
-    <ds:schemaRef ds:uri="http://purl.org/dc/dcmitype/"/>
-  </ds:schemaRefs>
-</ds:datastoreItem>
 </file>
</xml_diff>